<commit_message>
Fixed small typos in slide deck
</commit_message>
<xml_diff>
--- a/slides/4_DistanceAndSimilarityMeasures.pptx
+++ b/slides/4_DistanceAndSimilarityMeasures.pptx
@@ -232,7 +232,7 @@
           <a:p>
             <a:fld id="{8DD534D1-5B48-49E9-A024-C5EAE54CADD0}" type="datetimeFigureOut">
               <a:rPr lang="en-US" smtClean="0"/>
-              <a:t>6/19/2024</a:t>
+              <a:t>6/25/2024</a:t>
             </a:fld>
             <a:endParaRPr lang="en-US"/>
           </a:p>
@@ -3645,7 +3645,7 @@
           <a:p>
             <a:fld id="{9DC183D5-83EE-4A48-BB2E-1FC30CD8E44A}" type="datetimeFigureOut">
               <a:rPr lang="en-US" smtClean="0"/>
-              <a:t>6/19/2024</a:t>
+              <a:t>6/25/2024</a:t>
             </a:fld>
             <a:endParaRPr lang="en-US"/>
           </a:p>
@@ -3843,7 +3843,7 @@
           <a:p>
             <a:fld id="{9DC183D5-83EE-4A48-BB2E-1FC30CD8E44A}" type="datetimeFigureOut">
               <a:rPr lang="en-US" smtClean="0"/>
-              <a:t>6/19/2024</a:t>
+              <a:t>6/25/2024</a:t>
             </a:fld>
             <a:endParaRPr lang="en-US"/>
           </a:p>
@@ -4051,7 +4051,7 @@
           <a:p>
             <a:fld id="{9DC183D5-83EE-4A48-BB2E-1FC30CD8E44A}" type="datetimeFigureOut">
               <a:rPr lang="en-US" smtClean="0"/>
-              <a:t>6/19/2024</a:t>
+              <a:t>6/25/2024</a:t>
             </a:fld>
             <a:endParaRPr lang="en-US"/>
           </a:p>
@@ -4421,7 +4421,7 @@
           <a:p>
             <a:fld id="{9DC183D5-83EE-4A48-BB2E-1FC30CD8E44A}" type="datetimeFigureOut">
               <a:rPr lang="en-US" smtClean="0"/>
-              <a:t>6/19/2024</a:t>
+              <a:t>6/25/2024</a:t>
             </a:fld>
             <a:endParaRPr lang="en-US"/>
           </a:p>
@@ -4696,7 +4696,7 @@
           <a:p>
             <a:fld id="{9DC183D5-83EE-4A48-BB2E-1FC30CD8E44A}" type="datetimeFigureOut">
               <a:rPr lang="en-US" smtClean="0"/>
-              <a:t>6/19/2024</a:t>
+              <a:t>6/25/2024</a:t>
             </a:fld>
             <a:endParaRPr lang="en-US"/>
           </a:p>
@@ -4961,7 +4961,7 @@
           <a:p>
             <a:fld id="{9DC183D5-83EE-4A48-BB2E-1FC30CD8E44A}" type="datetimeFigureOut">
               <a:rPr lang="en-US" smtClean="0"/>
-              <a:t>6/19/2024</a:t>
+              <a:t>6/25/2024</a:t>
             </a:fld>
             <a:endParaRPr lang="en-US"/>
           </a:p>
@@ -5373,7 +5373,7 @@
           <a:p>
             <a:fld id="{9DC183D5-83EE-4A48-BB2E-1FC30CD8E44A}" type="datetimeFigureOut">
               <a:rPr lang="en-US" smtClean="0"/>
-              <a:t>6/19/2024</a:t>
+              <a:t>6/25/2024</a:t>
             </a:fld>
             <a:endParaRPr lang="en-US"/>
           </a:p>
@@ -5514,7 +5514,7 @@
           <a:p>
             <a:fld id="{9DC183D5-83EE-4A48-BB2E-1FC30CD8E44A}" type="datetimeFigureOut">
               <a:rPr lang="en-US" smtClean="0"/>
-              <a:t>6/19/2024</a:t>
+              <a:t>6/25/2024</a:t>
             </a:fld>
             <a:endParaRPr lang="en-US"/>
           </a:p>
@@ -5627,7 +5627,7 @@
           <a:p>
             <a:fld id="{9DC183D5-83EE-4A48-BB2E-1FC30CD8E44A}" type="datetimeFigureOut">
               <a:rPr lang="en-US" smtClean="0"/>
-              <a:t>6/19/2024</a:t>
+              <a:t>6/25/2024</a:t>
             </a:fld>
             <a:endParaRPr lang="en-US"/>
           </a:p>
@@ -5938,7 +5938,7 @@
           <a:p>
             <a:fld id="{9DC183D5-83EE-4A48-BB2E-1FC30CD8E44A}" type="datetimeFigureOut">
               <a:rPr lang="en-US" smtClean="0"/>
-              <a:t>6/19/2024</a:t>
+              <a:t>6/25/2024</a:t>
             </a:fld>
             <a:endParaRPr lang="en-US"/>
           </a:p>
@@ -6226,7 +6226,7 @@
           <a:p>
             <a:fld id="{9DC183D5-83EE-4A48-BB2E-1FC30CD8E44A}" type="datetimeFigureOut">
               <a:rPr lang="en-US" smtClean="0"/>
-              <a:t>6/19/2024</a:t>
+              <a:t>6/25/2024</a:t>
             </a:fld>
             <a:endParaRPr lang="en-US"/>
           </a:p>
@@ -6467,7 +6467,7 @@
           <a:p>
             <a:fld id="{9DC183D5-83EE-4A48-BB2E-1FC30CD8E44A}" type="datetimeFigureOut">
               <a:rPr lang="en-US" smtClean="0"/>
-              <a:t>6/19/2024</a:t>
+              <a:t>6/25/2024</a:t>
             </a:fld>
             <a:endParaRPr lang="en-US"/>
           </a:p>
@@ -6941,17 +6941,6 @@
               </a:rPr>
               <a:t>Distance and Similarity Measures</a:t>
             </a:r>
-            <a:br>
-              <a:rPr lang="en-US" dirty="0">
-                <a:latin typeface="+mn-lt"/>
-              </a:rPr>
-            </a:br>
-            <a:r>
-              <a:rPr lang="en-US" dirty="0">
-                <a:latin typeface="+mn-lt"/>
-              </a:rPr>
-              <a:t>Part I</a:t>
-            </a:r>
           </a:p>
         </p:txBody>
       </p:sp>
@@ -7137,8 +7126,8 @@
           </a:p>
         </p:txBody>
       </p:sp>
-      <mc:AlternateContent xmlns:mc="http://schemas.openxmlformats.org/markup-compatibility/2006" xmlns:a14="http://schemas.microsoft.com/office/drawing/2010/main">
-        <mc:Choice Requires="a14">
+      <mc:AlternateContent xmlns:mc="http://schemas.openxmlformats.org/markup-compatibility/2006">
+        <mc:Choice xmlns:a14="http://schemas.microsoft.com/office/drawing/2010/main" Requires="a14">
           <p:sp>
             <p:nvSpPr>
               <p:cNvPr id="3" name="Content Placeholder 2"/>
@@ -7192,6 +7181,23 @@
                   </a:rPr>
                   <a:t>(standardized Euclidean distance) is useful in cases with dependency between variables  </a:t>
                 </a:r>
+              </a:p>
+              <a:p>
+                <a:r>
+                  <a:rPr lang="en-US" dirty="0">
+                    <a:latin typeface="+mn-lt"/>
+                  </a:rPr>
+                  <a:t>Is a ‘pseudo-distance</a:t>
+                </a:r>
+                <a:r>
+                  <a:rPr lang="en-US">
+                    <a:latin typeface="+mn-lt"/>
+                  </a:rPr>
+                  <a:t>’ metric </a:t>
+                </a:r>
+                <a:endParaRPr lang="en-US" dirty="0">
+                  <a:latin typeface="+mn-lt"/>
+                </a:endParaRPr>
               </a:p>
               <a:p>
                 <a:r>
@@ -7516,7 +7522,7 @@
             </p:txBody>
           </p:sp>
         </mc:Choice>
-        <mc:Fallback xmlns="">
+        <mc:Fallback>
           <p:sp>
             <p:nvSpPr>
               <p:cNvPr id="3" name="Content Placeholder 2"/>
@@ -7664,15 +7670,33 @@
                                   </p:childTnLst>
                                 </p:cTn>
                               </p:par>
+                            </p:childTnLst>
+                          </p:cTn>
+                        </p:par>
+                      </p:childTnLst>
+                    </p:cTn>
+                  </p:par>
+                  <p:par>
+                    <p:cTn id="11" fill="hold">
+                      <p:stCondLst>
+                        <p:cond delay="indefinite"/>
+                      </p:stCondLst>
+                      <p:childTnLst>
+                        <p:par>
+                          <p:cTn id="12" fill="hold">
+                            <p:stCondLst>
+                              <p:cond delay="0"/>
+                            </p:stCondLst>
+                            <p:childTnLst>
                               <p:par>
-                                <p:cTn id="11" presetID="1" presetClass="entr" presetSubtype="0" fill="hold" nodeType="withEffect">
+                                <p:cTn id="13" presetID="1" presetClass="entr" presetSubtype="0" fill="hold" nodeType="clickEffect">
                                   <p:stCondLst>
                                     <p:cond delay="0"/>
                                   </p:stCondLst>
                                   <p:childTnLst>
                                     <p:set>
                                       <p:cBhvr>
-                                        <p:cTn id="12" dur="1" fill="hold">
+                                        <p:cTn id="14" dur="1" fill="hold">
                                           <p:stCondLst>
                                             <p:cond delay="0"/>
                                           </p:stCondLst>
@@ -7696,14 +7720,14 @@
                                 </p:cTn>
                               </p:par>
                               <p:par>
-                                <p:cTn id="13" presetID="1" presetClass="entr" presetSubtype="0" fill="hold" nodeType="withEffect">
+                                <p:cTn id="15" presetID="1" presetClass="entr" presetSubtype="0" fill="hold" nodeType="withEffect">
                                   <p:stCondLst>
                                     <p:cond delay="0"/>
                                   </p:stCondLst>
                                   <p:childTnLst>
                                     <p:set>
                                       <p:cBhvr>
-                                        <p:cTn id="14" dur="1" fill="hold">
+                                        <p:cTn id="16" dur="1" fill="hold">
                                           <p:stCondLst>
                                             <p:cond delay="0"/>
                                           </p:stCondLst>
@@ -7726,26 +7750,8 @@
                                   </p:childTnLst>
                                 </p:cTn>
                               </p:par>
-                            </p:childTnLst>
-                          </p:cTn>
-                        </p:par>
-                      </p:childTnLst>
-                    </p:cTn>
-                  </p:par>
-                  <p:par>
-                    <p:cTn id="15" fill="hold">
-                      <p:stCondLst>
-                        <p:cond delay="indefinite"/>
-                      </p:stCondLst>
-                      <p:childTnLst>
-                        <p:par>
-                          <p:cTn id="16" fill="hold">
-                            <p:stCondLst>
-                              <p:cond delay="0"/>
-                            </p:stCondLst>
-                            <p:childTnLst>
                               <p:par>
-                                <p:cTn id="17" presetID="1" presetClass="entr" presetSubtype="0" fill="hold" nodeType="clickEffect">
+                                <p:cTn id="17" presetID="1" presetClass="entr" presetSubtype="0" fill="hold" nodeType="withEffect">
                                   <p:stCondLst>
                                     <p:cond delay="0"/>
                                   </p:stCondLst>
@@ -7761,6 +7767,55 @@
                                           <p:spTgt spid="3">
                                             <p:txEl>
                                               <p:pRg st="5" end="5"/>
+                                            </p:txEl>
+                                          </p:spTgt>
+                                        </p:tgtEl>
+                                        <p:attrNameLst>
+                                          <p:attrName>style.visibility</p:attrName>
+                                        </p:attrNameLst>
+                                      </p:cBhvr>
+                                      <p:to>
+                                        <p:strVal val="visible"/>
+                                      </p:to>
+                                    </p:set>
+                                  </p:childTnLst>
+                                </p:cTn>
+                              </p:par>
+                            </p:childTnLst>
+                          </p:cTn>
+                        </p:par>
+                      </p:childTnLst>
+                    </p:cTn>
+                  </p:par>
+                  <p:par>
+                    <p:cTn id="19" fill="hold">
+                      <p:stCondLst>
+                        <p:cond delay="indefinite"/>
+                      </p:stCondLst>
+                      <p:childTnLst>
+                        <p:par>
+                          <p:cTn id="20" fill="hold">
+                            <p:stCondLst>
+                              <p:cond delay="0"/>
+                            </p:stCondLst>
+                            <p:childTnLst>
+                              <p:par>
+                                <p:cTn id="21" presetID="1" presetClass="entr" presetSubtype="0" fill="hold" nodeType="clickEffect">
+                                  <p:stCondLst>
+                                    <p:cond delay="0"/>
+                                  </p:stCondLst>
+                                  <p:childTnLst>
+                                    <p:set>
+                                      <p:cBhvr>
+                                        <p:cTn id="22" dur="1" fill="hold">
+                                          <p:stCondLst>
+                                            <p:cond delay="0"/>
+                                          </p:stCondLst>
+                                        </p:cTn>
+                                        <p:tgtEl>
+                                          <p:spTgt spid="3">
+                                            <p:txEl>
+                                              <p:pRg st="6" end="6"/>
                                             </p:txEl>
                                           </p:spTgt>
                                         </p:tgtEl>

</xml_diff>

<commit_message>
Updates and corrections to metrics slides
</commit_message>
<xml_diff>
--- a/slides/4_DistanceAndSimilarityMeasures.pptx
+++ b/slides/4_DistanceAndSimilarityMeasures.pptx
@@ -236,7 +236,7 @@
           <a:p>
             <a:fld id="{8DD534D1-5B48-49E9-A024-C5EAE54CADD0}" type="datetimeFigureOut">
               <a:rPr lang="en-US" smtClean="0"/>
-              <a:t>7/3/2024</a:t>
+              <a:t>2/19/2025</a:t>
             </a:fld>
             <a:endParaRPr lang="en-US"/>
           </a:p>
@@ -3989,7 +3989,7 @@
           <a:p>
             <a:fld id="{9DC183D5-83EE-4A48-BB2E-1FC30CD8E44A}" type="datetimeFigureOut">
               <a:rPr lang="en-US" smtClean="0"/>
-              <a:t>7/3/2024</a:t>
+              <a:t>2/19/2025</a:t>
             </a:fld>
             <a:endParaRPr lang="en-US"/>
           </a:p>
@@ -4187,7 +4187,7 @@
           <a:p>
             <a:fld id="{9DC183D5-83EE-4A48-BB2E-1FC30CD8E44A}" type="datetimeFigureOut">
               <a:rPr lang="en-US" smtClean="0"/>
-              <a:t>7/3/2024</a:t>
+              <a:t>2/19/2025</a:t>
             </a:fld>
             <a:endParaRPr lang="en-US"/>
           </a:p>
@@ -4395,7 +4395,7 @@
           <a:p>
             <a:fld id="{9DC183D5-83EE-4A48-BB2E-1FC30CD8E44A}" type="datetimeFigureOut">
               <a:rPr lang="en-US" smtClean="0"/>
-              <a:t>7/3/2024</a:t>
+              <a:t>2/19/2025</a:t>
             </a:fld>
             <a:endParaRPr lang="en-US"/>
           </a:p>
@@ -4765,7 +4765,7 @@
           <a:p>
             <a:fld id="{9DC183D5-83EE-4A48-BB2E-1FC30CD8E44A}" type="datetimeFigureOut">
               <a:rPr lang="en-US" smtClean="0"/>
-              <a:t>7/3/2024</a:t>
+              <a:t>2/19/2025</a:t>
             </a:fld>
             <a:endParaRPr lang="en-US"/>
           </a:p>
@@ -5040,7 +5040,7 @@
           <a:p>
             <a:fld id="{9DC183D5-83EE-4A48-BB2E-1FC30CD8E44A}" type="datetimeFigureOut">
               <a:rPr lang="en-US" smtClean="0"/>
-              <a:t>7/3/2024</a:t>
+              <a:t>2/19/2025</a:t>
             </a:fld>
             <a:endParaRPr lang="en-US"/>
           </a:p>
@@ -5305,7 +5305,7 @@
           <a:p>
             <a:fld id="{9DC183D5-83EE-4A48-BB2E-1FC30CD8E44A}" type="datetimeFigureOut">
               <a:rPr lang="en-US" smtClean="0"/>
-              <a:t>7/3/2024</a:t>
+              <a:t>2/19/2025</a:t>
             </a:fld>
             <a:endParaRPr lang="en-US"/>
           </a:p>
@@ -5717,7 +5717,7 @@
           <a:p>
             <a:fld id="{9DC183D5-83EE-4A48-BB2E-1FC30CD8E44A}" type="datetimeFigureOut">
               <a:rPr lang="en-US" smtClean="0"/>
-              <a:t>7/3/2024</a:t>
+              <a:t>2/19/2025</a:t>
             </a:fld>
             <a:endParaRPr lang="en-US"/>
           </a:p>
@@ -5858,7 +5858,7 @@
           <a:p>
             <a:fld id="{9DC183D5-83EE-4A48-BB2E-1FC30CD8E44A}" type="datetimeFigureOut">
               <a:rPr lang="en-US" smtClean="0"/>
-              <a:t>7/3/2024</a:t>
+              <a:t>2/19/2025</a:t>
             </a:fld>
             <a:endParaRPr lang="en-US"/>
           </a:p>
@@ -5971,7 +5971,7 @@
           <a:p>
             <a:fld id="{9DC183D5-83EE-4A48-BB2E-1FC30CD8E44A}" type="datetimeFigureOut">
               <a:rPr lang="en-US" smtClean="0"/>
-              <a:t>7/3/2024</a:t>
+              <a:t>2/19/2025</a:t>
             </a:fld>
             <a:endParaRPr lang="en-US"/>
           </a:p>
@@ -6282,7 +6282,7 @@
           <a:p>
             <a:fld id="{9DC183D5-83EE-4A48-BB2E-1FC30CD8E44A}" type="datetimeFigureOut">
               <a:rPr lang="en-US" smtClean="0"/>
-              <a:t>7/3/2024</a:t>
+              <a:t>2/19/2025</a:t>
             </a:fld>
             <a:endParaRPr lang="en-US"/>
           </a:p>
@@ -6570,7 +6570,7 @@
           <a:p>
             <a:fld id="{9DC183D5-83EE-4A48-BB2E-1FC30CD8E44A}" type="datetimeFigureOut">
               <a:rPr lang="en-US" smtClean="0"/>
-              <a:t>7/3/2024</a:t>
+              <a:t>2/19/2025</a:t>
             </a:fld>
             <a:endParaRPr lang="en-US"/>
           </a:p>
@@ -6811,7 +6811,7 @@
           <a:p>
             <a:fld id="{9DC183D5-83EE-4A48-BB2E-1FC30CD8E44A}" type="datetimeFigureOut">
               <a:rPr lang="en-US" smtClean="0"/>
-              <a:t>7/3/2024</a:t>
+              <a:t>2/19/2025</a:t>
             </a:fld>
             <a:endParaRPr lang="en-US"/>
           </a:p>
@@ -7402,7 +7402,15 @@
             <a:pPr algn="ctr"/>
             <a:r>
               <a:rPr lang="en-US" sz="1100" dirty="0"/>
-              <a:t>Copyright 2021, 2022, 2023, 2024, Stephen F Elston. All rights reserved</a:t>
+              <a:t>Copyright 2021, 2022, 2023, </a:t>
+            </a:r>
+            <a:r>
+              <a:rPr lang="en-US" sz="1100"/>
+              <a:t>2024, 2025 </a:t>
+            </a:r>
+            <a:r>
+              <a:rPr lang="en-US" sz="1100" dirty="0"/>
+              <a:t>Stephen F Elston. All rights reserved</a:t>
             </a:r>
             <a:r>
               <a:rPr lang="en-US" dirty="0"/>
@@ -12206,8 +12214,8 @@
           </a:p>
         </p:txBody>
       </p:sp>
-      <mc:AlternateContent xmlns:mc="http://schemas.openxmlformats.org/markup-compatibility/2006">
-        <mc:Choice xmlns:a14="http://schemas.microsoft.com/office/drawing/2010/main" Requires="a14">
+      <mc:AlternateContent xmlns:mc="http://schemas.openxmlformats.org/markup-compatibility/2006" xmlns:a14="http://schemas.microsoft.com/office/drawing/2010/main">
+        <mc:Choice Requires="a14">
           <p:sp>
             <p:nvSpPr>
               <p:cNvPr id="3" name="Content Placeholder 2"/>
@@ -12653,7 +12661,7 @@
             </p:txBody>
           </p:sp>
         </mc:Choice>
-        <mc:Fallback>
+        <mc:Fallback xmlns="">
           <p:sp>
             <p:nvSpPr>
               <p:cNvPr id="3" name="Content Placeholder 2"/>
@@ -14990,8 +14998,8 @@
           </a:p>
         </p:txBody>
       </p:sp>
-      <mc:AlternateContent xmlns:mc="http://schemas.openxmlformats.org/markup-compatibility/2006" xmlns:a14="http://schemas.microsoft.com/office/drawing/2010/main">
-        <mc:Choice Requires="a14">
+      <mc:AlternateContent xmlns:mc="http://schemas.openxmlformats.org/markup-compatibility/2006">
+        <mc:Choice xmlns:a14="http://schemas.microsoft.com/office/drawing/2010/main" Requires="a14">
           <p:sp>
             <p:nvSpPr>
               <p:cNvPr id="3" name="Content Placeholder 2"/>
@@ -15159,6 +15167,17 @@
                 </a:r>
               </a:p>
               <a:p>
+                <a:pPr marL="457200" lvl="1" indent="0">
+                  <a:buNone/>
+                </a:pPr>
+                <a:r>
+                  <a:rPr lang="en-US" dirty="0">
+                    <a:latin typeface="+mn-lt"/>
+                  </a:rPr>
+                  <a:t>				edit distance = 3</a:t>
+                </a:r>
+              </a:p>
+              <a:p>
                 <a:r>
                   <a:rPr lang="en-US" dirty="0">
                     <a:latin typeface="+mn-lt"/>
@@ -15219,7 +15238,7 @@
             </p:txBody>
           </p:sp>
         </mc:Choice>
-        <mc:Fallback xmlns="">
+        <mc:Fallback>
           <p:sp>
             <p:nvSpPr>
               <p:cNvPr id="3" name="Content Placeholder 2"/>
@@ -15491,33 +15510,15 @@
                                   </p:childTnLst>
                                 </p:cTn>
                               </p:par>
-                            </p:childTnLst>
-                          </p:cTn>
-                        </p:par>
-                      </p:childTnLst>
-                    </p:cTn>
-                  </p:par>
-                  <p:par>
-                    <p:cTn id="19" fill="hold">
-                      <p:stCondLst>
-                        <p:cond delay="indefinite"/>
-                      </p:stCondLst>
-                      <p:childTnLst>
-                        <p:par>
-                          <p:cTn id="20" fill="hold">
-                            <p:stCondLst>
-                              <p:cond delay="0"/>
-                            </p:stCondLst>
-                            <p:childTnLst>
                               <p:par>
-                                <p:cTn id="21" presetID="1" presetClass="entr" presetSubtype="0" fill="hold" nodeType="clickEffect">
+                                <p:cTn id="19" presetID="1" presetClass="entr" presetSubtype="0" fill="hold" nodeType="withEffect">
                                   <p:stCondLst>
                                     <p:cond delay="0"/>
                                   </p:stCondLst>
                                   <p:childTnLst>
                                     <p:set>
                                       <p:cBhvr>
-                                        <p:cTn id="22" dur="1" fill="hold">
+                                        <p:cTn id="20" dur="1" fill="hold">
                                           <p:stCondLst>
                                             <p:cond delay="0"/>
                                           </p:stCondLst>
@@ -15540,8 +15541,26 @@
                                   </p:childTnLst>
                                 </p:cTn>
                               </p:par>
+                            </p:childTnLst>
+                          </p:cTn>
+                        </p:par>
+                      </p:childTnLst>
+                    </p:cTn>
+                  </p:par>
+                  <p:par>
+                    <p:cTn id="21" fill="hold">
+                      <p:stCondLst>
+                        <p:cond delay="indefinite"/>
+                      </p:stCondLst>
+                      <p:childTnLst>
+                        <p:par>
+                          <p:cTn id="22" fill="hold">
+                            <p:stCondLst>
+                              <p:cond delay="0"/>
+                            </p:stCondLst>
+                            <p:childTnLst>
                               <p:par>
-                                <p:cTn id="23" presetID="1" presetClass="entr" presetSubtype="0" fill="hold" nodeType="withEffect">
+                                <p:cTn id="23" presetID="1" presetClass="entr" presetSubtype="0" fill="hold" nodeType="clickEffect">
                                   <p:stCondLst>
                                     <p:cond delay="0"/>
                                   </p:stCondLst>
@@ -15650,6 +15669,37 @@
                                           <p:spTgt spid="3">
                                             <p:txEl>
                                               <p:pRg st="11" end="11"/>
+                                            </p:txEl>
+                                          </p:spTgt>
+                                        </p:tgtEl>
+                                        <p:attrNameLst>
+                                          <p:attrName>style.visibility</p:attrName>
+                                        </p:attrNameLst>
+                                      </p:cBhvr>
+                                      <p:to>
+                                        <p:strVal val="visible"/>
+                                      </p:to>
+                                    </p:set>
+                                  </p:childTnLst>
+                                </p:cTn>
+                              </p:par>
+                              <p:par>
+                                <p:cTn id="31" presetID="1" presetClass="entr" presetSubtype="0" fill="hold" nodeType="withEffect">
+                                  <p:stCondLst>
+                                    <p:cond delay="0"/>
+                                  </p:stCondLst>
+                                  <p:childTnLst>
+                                    <p:set>
+                                      <p:cBhvr>
+                                        <p:cTn id="32" dur="1" fill="hold">
+                                          <p:stCondLst>
+                                            <p:cond delay="0"/>
+                                          </p:stCondLst>
+                                        </p:cTn>
+                                        <p:tgtEl>
+                                          <p:spTgt spid="3">
+                                            <p:txEl>
+                                              <p:pRg st="12" end="12"/>
                                             </p:txEl>
                                           </p:spTgt>
                                         </p:tgtEl>
@@ -17104,8 +17154,8 @@
           </a:p>
         </p:txBody>
       </p:sp>
-      <mc:AlternateContent xmlns:mc="http://schemas.openxmlformats.org/markup-compatibility/2006" xmlns:a14="http://schemas.microsoft.com/office/drawing/2010/main">
-        <mc:Choice Requires="a14">
+      <mc:AlternateContent xmlns:mc="http://schemas.openxmlformats.org/markup-compatibility/2006">
+        <mc:Choice xmlns:a14="http://schemas.microsoft.com/office/drawing/2010/main" Requires="a14">
           <p:sp>
             <p:nvSpPr>
               <p:cNvPr id="3" name="Content Placeholder 2"/>
@@ -17281,7 +17331,7 @@
                   <a:rPr lang="en-US" dirty="0">
                     <a:latin typeface="+mn-lt"/>
                   </a:rPr>
-                  <a:t>Attributes may not have equal importance</a:t>
+                  <a:t>Attributes (dimensions) may not have equal importance</a:t>
                 </a:r>
               </a:p>
               <a:p>
@@ -17305,7 +17355,7 @@
             </p:txBody>
           </p:sp>
         </mc:Choice>
-        <mc:Fallback xmlns="">
+        <mc:Fallback>
           <p:sp>
             <p:nvSpPr>
               <p:cNvPr id="3" name="Content Placeholder 2"/>
@@ -20302,7 +20352,7 @@
               <a:rPr lang="en-US" sz="2400" i="1" dirty="0">
                 <a:latin typeface="+mn-lt"/>
               </a:rPr>
-              <a:t>Important Note: There is some controversy around methodology for combining distance metrics of different data types. Some textbooks and theoreticians say combining types should never be done. Pragmatists, realize we must do something, even if questionable. </a:t>
+              <a:t>Important Note: There is some controversy around methodology for combining distance metrics of different data types. Some textbooks and theoreticians say combining types should never be done. Pragmatists realize we must do something, even if questionable. </a:t>
             </a:r>
           </a:p>
         </p:txBody>
@@ -24460,8 +24510,8 @@
           </a:p>
         </p:txBody>
       </p:sp>
-      <mc:AlternateContent xmlns:mc="http://schemas.openxmlformats.org/markup-compatibility/2006" xmlns:a14="http://schemas.microsoft.com/office/drawing/2010/main">
-        <mc:Choice Requires="a14">
+      <mc:AlternateContent xmlns:mc="http://schemas.openxmlformats.org/markup-compatibility/2006">
+        <mc:Choice xmlns:a14="http://schemas.microsoft.com/office/drawing/2010/main" Requires="a14">
           <p:sp>
             <p:nvSpPr>
               <p:cNvPr id="3" name="Content Placeholder 2"/>
@@ -25051,10 +25101,30 @@
               <a:p>
                 <a:pPr lvl="1"/>
                 <a:r>
+                  <a:rPr lang="en-US" b="1" dirty="0">
+                    <a:latin typeface="+mn-lt"/>
+                    <a:hlinkClick r:id="rId3"/>
+                  </a:rPr>
+                  <a:t>Kendal</a:t>
+                </a:r>
+                <a:r>
                   <a:rPr lang="en-US" dirty="0">
                     <a:latin typeface="+mn-lt"/>
                   </a:rPr>
-                  <a:t>Kendal, Spearman, more robust than Pearson</a:t>
+                  <a:t>, </a:t>
+                </a:r>
+                <a:r>
+                  <a:rPr lang="en-US" b="1" dirty="0">
+                    <a:latin typeface="+mn-lt"/>
+                    <a:hlinkClick r:id="rId4"/>
+                  </a:rPr>
+                  <a:t>Spearman</a:t>
+                </a:r>
+                <a:r>
+                  <a:rPr lang="en-US" dirty="0">
+                    <a:latin typeface="+mn-lt"/>
+                  </a:rPr>
+                  <a:t>, are rank correlations, more robust than Pearson</a:t>
                 </a:r>
               </a:p>
               <a:p>
@@ -25063,7 +25133,7 @@
                   <a:rPr lang="en-US" dirty="0">
                     <a:latin typeface="+mn-lt"/>
                   </a:rPr>
-                  <a:t>Often better choice for data mining </a:t>
+                  <a:t>Often better choices for data mining </a:t>
                 </a:r>
               </a:p>
               <a:p>
@@ -25077,7 +25147,7 @@
             </p:txBody>
           </p:sp>
         </mc:Choice>
-        <mc:Fallback xmlns="">
+        <mc:Fallback>
           <p:sp>
             <p:nvSpPr>
               <p:cNvPr id="3" name="Content Placeholder 2"/>
@@ -25094,7 +25164,7 @@
                 <a:ext cx="11525250" cy="5363577"/>
               </a:xfrm>
               <a:blipFill>
-                <a:blip r:embed="rId3"/>
+                <a:blip r:embed="rId5"/>
                 <a:stretch>
                   <a:fillRect l="-1111" t="-1818"/>
                 </a:stretch>
@@ -34929,8 +34999,8 @@
           </a:p>
         </p:txBody>
       </p:sp>
-      <mc:AlternateContent xmlns:mc="http://schemas.openxmlformats.org/markup-compatibility/2006" xmlns:a14="http://schemas.microsoft.com/office/drawing/2010/main">
-        <mc:Choice Requires="a14">
+      <mc:AlternateContent xmlns:mc="http://schemas.openxmlformats.org/markup-compatibility/2006">
+        <mc:Choice xmlns:a14="http://schemas.microsoft.com/office/drawing/2010/main" Requires="a14">
           <p:sp>
             <p:nvSpPr>
               <p:cNvPr id="3" name="Content Placeholder 2"/>
@@ -35154,7 +35224,7 @@
                   <a:buNone/>
                 </a:pPr>
                 <a:r>
-                  <a:rPr lang="en-US" dirty="0">
+                  <a:rPr lang="en-US" b="1" dirty="0">
                     <a:solidFill>
                       <a:srgbClr val="C00000"/>
                     </a:solidFill>
@@ -35174,7 +35244,7 @@
             </p:txBody>
           </p:sp>
         </mc:Choice>
-        <mc:Fallback xmlns="">
+        <mc:Fallback>
           <p:sp>
             <p:nvSpPr>
               <p:cNvPr id="3" name="Content Placeholder 2"/>
@@ -38649,7 +38719,7 @@
               <a:rPr lang="en-US" sz="3200" b="1" dirty="0">
                 <a:latin typeface="+mn-lt"/>
               </a:rPr>
-              <a:t>real scalar value    </a:t>
+              <a:t>real valued scalar</a:t>
             </a:r>
           </a:p>
         </p:txBody>
@@ -40029,8 +40099,8 @@
           </a:p>
         </p:txBody>
       </p:sp>
-      <mc:AlternateContent xmlns:mc="http://schemas.openxmlformats.org/markup-compatibility/2006" xmlns:a14="http://schemas.microsoft.com/office/drawing/2010/main">
-        <mc:Choice Requires="a14">
+      <mc:AlternateContent xmlns:mc="http://schemas.openxmlformats.org/markup-compatibility/2006">
+        <mc:Choice xmlns:a14="http://schemas.microsoft.com/office/drawing/2010/main" Requires="a14">
           <p:sp>
             <p:nvSpPr>
               <p:cNvPr id="3" name="Content Placeholder 2"/>
@@ -40533,6 +40603,18 @@
                             <m:mr>
                               <m:e>
                                 <m:r>
+                                  <a:rPr lang="en-US" i="1">
+                                    <a:latin typeface="Cambria Math" panose="02040503050406030204" pitchFamily="18" charset="0"/>
+                                  </a:rPr>
+                                  <m:t>⋮</m:t>
+                                </m:r>
+                                <m:r>
+                                  <a:rPr lang="en-US" b="0" i="1" smtClean="0">
+                                    <a:latin typeface="Cambria Math" panose="02040503050406030204" pitchFamily="18" charset="0"/>
+                                  </a:rPr>
+                                  <m:t>                 </m:t>
+                                </m:r>
+                                <m:r>
                                   <a:rPr lang="en-US" sz="2800" b="0" i="1" smtClean="0">
                                     <a:latin typeface="Cambria Math" panose="02040503050406030204" pitchFamily="18" charset="0"/>
                                   </a:rPr>
@@ -40835,7 +40917,7 @@
             </p:txBody>
           </p:sp>
         </mc:Choice>
-        <mc:Fallback xmlns="">
+        <mc:Fallback>
           <p:sp>
             <p:nvSpPr>
               <p:cNvPr id="3" name="Content Placeholder 2"/>

</xml_diff>